<commit_message>
Pptx with fixed walrus
</commit_message>
<xml_diff>
--- a/Predstavitev.pptx
+++ b/Predstavitev.pptx
@@ -114,6 +114,11 @@
       </a:defRPr>
     </a:lvl9pPr>
   </p:defaultTextStyle>
+  <p:extLst>
+    <p:ext uri="{EFAFB233-063F-42B5-8137-9DF3F51BA10A}">
+      <p15:sldGuideLst xmlns:p15="http://schemas.microsoft.com/office/powerpoint/2012/main"/>
+    </p:ext>
+  </p:extLst>
 </p:presentation>
 </file>
 
@@ -11195,7 +11200,7 @@
           <a:p>
             <a:r>
               <a:rPr lang="en-SI" dirty="0"/>
-              <a:t>Agents act based on factors for themselves (alpha) and for the best agent (beta) (alpha = exploration, beta = following others)</a:t>
+              <a:t>Agents have a number that presents attraction to other walruses(alpha), attraction to the best walrus (beta) and their own desires (delta)</a:t>
             </a:r>
           </a:p>
           <a:p>

</xml_diff>